<commit_message>
Ist SMEmu Restful fehlt noch
</commit_message>
<xml_diff>
--- a/RESTPräsi.pptx
+++ b/RESTPräsi.pptx
@@ -741,7 +741,7 @@
           <a:graphicData uri="http://schemas.openxmlformats.org/presentationml/2006/ole">
             <mc:AlternateContent xmlns:mc="http://schemas.openxmlformats.org/markup-compatibility/2006">
               <mc:Choice xmlns:v="urn:schemas-microsoft-com:vml" Requires="v">
-                <p:oleObj spid="_x0000_s2084" r:id="rId9" imgW="0" imgH="0" progId="TCLayout.ActiveDocument.1">
+                <p:oleObj spid="_x0000_s2086" r:id="rId9" imgW="0" imgH="0" progId="TCLayout.ActiveDocument.1">
                   <p:embed/>
                 </p:oleObj>
               </mc:Choice>
@@ -1587,7 +1587,7 @@
           <a:graphicData uri="http://schemas.openxmlformats.org/presentationml/2006/ole">
             <mc:AlternateContent xmlns:mc="http://schemas.openxmlformats.org/markup-compatibility/2006">
               <mc:Choice xmlns:v="urn:schemas-microsoft-com:vml" Requires="v">
-                <p:oleObj spid="_x0000_s4131" r:id="rId9" imgW="0" imgH="0" progId="TCLayout.ActiveDocument.1">
+                <p:oleObj spid="_x0000_s4133" r:id="rId9" imgW="0" imgH="0" progId="TCLayout.ActiveDocument.1">
                   <p:embed/>
                 </p:oleObj>
               </mc:Choice>
@@ -6031,7 +6031,7 @@
           <a:graphicData uri="http://schemas.openxmlformats.org/presentationml/2006/ole">
             <mc:AlternateContent xmlns:mc="http://schemas.openxmlformats.org/markup-compatibility/2006">
               <mc:Choice xmlns:v="urn:schemas-microsoft-com:vml" Requires="v">
-                <p:oleObj spid="_x0000_s1060" r:id="rId20" imgW="0" imgH="0" progId="TCLayout.ActiveDocument.1">
+                <p:oleObj spid="_x0000_s1062" r:id="rId20" imgW="0" imgH="0" progId="TCLayout.ActiveDocument.1">
                   <p:embed/>
                 </p:oleObj>
               </mc:Choice>
@@ -7213,7 +7213,7 @@
           <a:graphicData uri="http://schemas.openxmlformats.org/presentationml/2006/ole">
             <mc:AlternateContent xmlns:mc="http://schemas.openxmlformats.org/markup-compatibility/2006">
               <mc:Choice xmlns:v="urn:schemas-microsoft-com:vml" Requires="v">
-                <p:oleObj spid="_x0000_s3107" r:id="rId20" imgW="0" imgH="0" progId="TCLayout.ActiveDocument.1">
+                <p:oleObj spid="_x0000_s3109" r:id="rId20" imgW="0" imgH="0" progId="TCLayout.ActiveDocument.1">
                   <p:embed/>
                 </p:oleObj>
               </mc:Choice>
@@ -10786,7 +10786,39 @@
           <a:bodyPr/>
           <a:lstStyle/>
           <a:p>
+            <a:r>
+              <a:rPr lang="de-DE" dirty="0"/>
+              <a:t>Erstellt Smartmeter und </a:t>
+            </a:r>
+            <a:r>
+              <a:rPr lang="de-DE" dirty="0" err="1"/>
+              <a:t>Measurands</a:t>
+            </a:r>
+            <a:r>
+              <a:rPr lang="de-DE" dirty="0"/>
+              <a:t> und nimmt die Testmessungen vor.</a:t>
+            </a:r>
+          </a:p>
+          <a:p>
             <a:endParaRPr lang="de-DE" dirty="0"/>
+          </a:p>
+          <a:p>
+            <a:r>
+              <a:rPr lang="de-DE" dirty="0" err="1"/>
+              <a:t>SMEmu</a:t>
+            </a:r>
+            <a:r>
+              <a:rPr lang="de-DE" dirty="0"/>
+              <a:t> </a:t>
+            </a:r>
+            <a:r>
+              <a:rPr lang="de-DE" dirty="0" err="1"/>
+              <a:t>Restful</a:t>
+            </a:r>
+            <a:r>
+              <a:rPr lang="de-DE" dirty="0"/>
+              <a:t>?</a:t>
+            </a:r>
           </a:p>
         </p:txBody>
       </p:sp>

</xml_diff>